<commit_message>
removed m02 data, added comment in s26
</commit_message>
<xml_diff>
--- a/Slides/Module 05 Interaction-Level Design Patterns.pptx
+++ b/Slides/Module 05 Interaction-Level Design Patterns.pptx
@@ -3224,7 +3224,7 @@
           <a:p>
             <a:fld id="{7C7E5181-6CF5-45F7-A87A-E0E0B1FD7549}" type="datetimeFigureOut">
               <a:rPr lang="en-US" smtClean="0"/>
-              <a:t>7/1/2025</a:t>
+              <a:t>7/8/2025</a:t>
             </a:fld>
             <a:endParaRPr lang="en-US"/>
           </a:p>
@@ -4911,8 +4911,13 @@
           <a:p>
             <a:r>
               <a:rPr lang="en-US" dirty="0"/>
-              <a:t>But now the client has access to *all* of the server's methods.  Maybe the server has many public methods, and it doesn't want the client to have access to all of them.</a:t>
-            </a:r>
+              <a:t>But now the client has access to *all* of the server's methods.  Maybe the server has many public methods, and it doesn't want the client to have access to all of them.  Our next pattern, the callback pattern, provides a solution to </a:t>
+            </a:r>
+            <a:r>
+              <a:rPr lang="en-US"/>
+              <a:t>this problem.</a:t>
+            </a:r>
+            <a:endParaRPr lang="en-US" dirty="0"/>
           </a:p>
         </p:txBody>
       </p:sp>
@@ -6655,7 +6660,7 @@
           <a:p>
             <a:fld id="{5D2A64DE-480B-420F-9649-4F8E696E08E0}" type="datetime1">
               <a:rPr lang="en-US" smtClean="0"/>
-              <a:t>7/1/2025</a:t>
+              <a:t>7/8/2025</a:t>
             </a:fld>
             <a:endParaRPr lang="en-US"/>
           </a:p>
@@ -6979,7 +6984,7 @@
           <a:p>
             <a:fld id="{EA476A42-A091-4468-A075-64A31BE59948}" type="datetime1">
               <a:rPr lang="en-US" smtClean="0"/>
-              <a:t>7/1/2025</a:t>
+              <a:t>7/8/2025</a:t>
             </a:fld>
             <a:endParaRPr lang="en-US"/>
           </a:p>
@@ -7177,7 +7182,7 @@
           <a:p>
             <a:fld id="{0D3616D0-8311-4107-9726-6B805E7D05BA}" type="datetime1">
               <a:rPr lang="en-US" smtClean="0"/>
-              <a:t>7/1/2025</a:t>
+              <a:t>7/8/2025</a:t>
             </a:fld>
             <a:endParaRPr lang="en-US"/>
           </a:p>
@@ -7385,7 +7390,7 @@
           <a:p>
             <a:fld id="{3BC2557A-5C88-417A-A763-5AC779462A5F}" type="datetime1">
               <a:rPr lang="en-US" smtClean="0"/>
-              <a:t>7/1/2025</a:t>
+              <a:t>7/8/2025</a:t>
             </a:fld>
             <a:endParaRPr lang="en-US"/>
           </a:p>
@@ -7909,7 +7914,7 @@
           <a:p>
             <a:fld id="{07C7BFD4-467E-4EDE-93EA-052F5B39A4E5}" type="datetime1">
               <a:rPr lang="en-US" smtClean="0"/>
-              <a:t>7/1/2025</a:t>
+              <a:t>7/8/2025</a:t>
             </a:fld>
             <a:endParaRPr lang="en-US"/>
           </a:p>
@@ -8159,7 +8164,7 @@
           <a:p>
             <a:fld id="{07C7BFD4-467E-4EDE-93EA-052F5B39A4E5}" type="datetime1">
               <a:rPr lang="en-US" smtClean="0"/>
-              <a:t>7/1/2025</a:t>
+              <a:t>7/8/2025</a:t>
             </a:fld>
             <a:endParaRPr lang="en-US"/>
           </a:p>
@@ -8347,7 +8352,7 @@
           <a:p>
             <a:fld id="{109E55A0-C911-4F03-82FC-7E5926047D46}" type="datetime1">
               <a:rPr lang="en-US" smtClean="0"/>
-              <a:t>7/1/2025</a:t>
+              <a:t>7/8/2025</a:t>
             </a:fld>
             <a:endParaRPr lang="en-US"/>
           </a:p>
@@ -8660,7 +8665,7 @@
           <a:p>
             <a:fld id="{A533CBE2-D5BE-47AC-ADC2-9CDFC1D0CF90}" type="datetime1">
               <a:rPr lang="en-US" smtClean="0"/>
-              <a:t>7/1/2025</a:t>
+              <a:t>7/8/2025</a:t>
             </a:fld>
             <a:endParaRPr lang="en-US"/>
           </a:p>
@@ -8961,7 +8966,7 @@
           <a:p>
             <a:fld id="{39B7EDB1-CE74-4951-85A2-0B01C2128E28}" type="datetime1">
               <a:rPr lang="en-US" smtClean="0"/>
-              <a:t>7/1/2025</a:t>
+              <a:t>7/8/2025</a:t>
             </a:fld>
             <a:endParaRPr lang="en-US"/>
           </a:p>
@@ -9409,7 +9414,7 @@
           <a:p>
             <a:fld id="{2BC7EB92-A5C2-4807-A9DC-9EDE6CBFB241}" type="datetime1">
               <a:rPr lang="en-US" smtClean="0"/>
-              <a:t>7/1/2025</a:t>
+              <a:t>7/8/2025</a:t>
             </a:fld>
             <a:endParaRPr lang="en-US"/>
           </a:p>
@@ -9522,7 +9527,7 @@
           <a:p>
             <a:fld id="{2B7B7EE0-7771-4CD5-9B2B-3550753A54A1}" type="datetime1">
               <a:rPr lang="en-US" smtClean="0"/>
-              <a:t>7/1/2025</a:t>
+              <a:t>7/8/2025</a:t>
             </a:fld>
             <a:endParaRPr lang="en-US"/>
           </a:p>
@@ -9833,7 +9838,7 @@
           <a:p>
             <a:fld id="{F8B318B3-0E87-4416-A9B8-D891968C2727}" type="datetime1">
               <a:rPr lang="en-US" smtClean="0"/>
-              <a:t>7/1/2025</a:t>
+              <a:t>7/8/2025</a:t>
             </a:fld>
             <a:endParaRPr lang="en-US"/>
           </a:p>
@@ -10074,7 +10079,7 @@
           <a:p>
             <a:fld id="{54D997E8-DDEE-43F1-8D9B-F8A1E11DE488}" type="datetime1">
               <a:rPr lang="en-US" smtClean="0"/>
-              <a:t>7/1/2025</a:t>
+              <a:t>7/8/2025</a:t>
             </a:fld>
             <a:endParaRPr lang="en-US"/>
           </a:p>

</xml_diff>

<commit_message>
updated copyright in slides
</commit_message>
<xml_diff>
--- a/Slides/Module 05 Interaction-Level Design Patterns.pptx
+++ b/Slides/Module 05 Interaction-Level Design Patterns.pptx
@@ -3224,7 +3224,7 @@
           <a:p>
             <a:fld id="{7C7E5181-6CF5-45F7-A87A-E0E0B1FD7549}" type="datetimeFigureOut">
               <a:rPr lang="en-US" smtClean="0"/>
-              <a:t>7/8/2025</a:t>
+              <a:t>9/6/2025</a:t>
             </a:fld>
             <a:endParaRPr lang="en-US"/>
           </a:p>
@@ -4911,13 +4911,8 @@
           <a:p>
             <a:r>
               <a:rPr lang="en-US" dirty="0"/>
-              <a:t>But now the client has access to *all* of the server's methods.  Maybe the server has many public methods, and it doesn't want the client to have access to all of them.  Our next pattern, the callback pattern, provides a solution to </a:t>
-            </a:r>
-            <a:r>
-              <a:rPr lang="en-US"/>
-              <a:t>this problem.</a:t>
-            </a:r>
-            <a:endParaRPr lang="en-US" dirty="0"/>
+              <a:t>But now the client has access to *all* of the server's methods.  Maybe the server has many public methods, and it doesn't want the client to have access to all of them.  Our next pattern, the callback pattern, provides a solution to this problem.</a:t>
+            </a:r>
           </a:p>
         </p:txBody>
       </p:sp>
@@ -6660,7 +6655,7 @@
           <a:p>
             <a:fld id="{5D2A64DE-480B-420F-9649-4F8E696E08E0}" type="datetime1">
               <a:rPr lang="en-US" smtClean="0"/>
-              <a:t>7/8/2025</a:t>
+              <a:t>9/6/2025</a:t>
             </a:fld>
             <a:endParaRPr lang="en-US"/>
           </a:p>
@@ -6984,7 +6979,7 @@
           <a:p>
             <a:fld id="{EA476A42-A091-4468-A075-64A31BE59948}" type="datetime1">
               <a:rPr lang="en-US" smtClean="0"/>
-              <a:t>7/8/2025</a:t>
+              <a:t>9/6/2025</a:t>
             </a:fld>
             <a:endParaRPr lang="en-US"/>
           </a:p>
@@ -7182,7 +7177,7 @@
           <a:p>
             <a:fld id="{0D3616D0-8311-4107-9726-6B805E7D05BA}" type="datetime1">
               <a:rPr lang="en-US" smtClean="0"/>
-              <a:t>7/8/2025</a:t>
+              <a:t>9/6/2025</a:t>
             </a:fld>
             <a:endParaRPr lang="en-US"/>
           </a:p>
@@ -7390,7 +7385,7 @@
           <a:p>
             <a:fld id="{3BC2557A-5C88-417A-A763-5AC779462A5F}" type="datetime1">
               <a:rPr lang="en-US" smtClean="0"/>
-              <a:t>7/8/2025</a:t>
+              <a:t>9/6/2025</a:t>
             </a:fld>
             <a:endParaRPr lang="en-US"/>
           </a:p>
@@ -7914,7 +7909,7 @@
           <a:p>
             <a:fld id="{07C7BFD4-467E-4EDE-93EA-052F5B39A4E5}" type="datetime1">
               <a:rPr lang="en-US" smtClean="0"/>
-              <a:t>7/8/2025</a:t>
+              <a:t>9/6/2025</a:t>
             </a:fld>
             <a:endParaRPr lang="en-US"/>
           </a:p>
@@ -8164,7 +8159,7 @@
           <a:p>
             <a:fld id="{07C7BFD4-467E-4EDE-93EA-052F5B39A4E5}" type="datetime1">
               <a:rPr lang="en-US" smtClean="0"/>
-              <a:t>7/8/2025</a:t>
+              <a:t>9/6/2025</a:t>
             </a:fld>
             <a:endParaRPr lang="en-US"/>
           </a:p>
@@ -8352,7 +8347,7 @@
           <a:p>
             <a:fld id="{109E55A0-C911-4F03-82FC-7E5926047D46}" type="datetime1">
               <a:rPr lang="en-US" smtClean="0"/>
-              <a:t>7/8/2025</a:t>
+              <a:t>9/6/2025</a:t>
             </a:fld>
             <a:endParaRPr lang="en-US"/>
           </a:p>
@@ -8665,7 +8660,7 @@
           <a:p>
             <a:fld id="{A533CBE2-D5BE-47AC-ADC2-9CDFC1D0CF90}" type="datetime1">
               <a:rPr lang="en-US" smtClean="0"/>
-              <a:t>7/8/2025</a:t>
+              <a:t>9/6/2025</a:t>
             </a:fld>
             <a:endParaRPr lang="en-US"/>
           </a:p>
@@ -8966,7 +8961,7 @@
           <a:p>
             <a:fld id="{39B7EDB1-CE74-4951-85A2-0B01C2128E28}" type="datetime1">
               <a:rPr lang="en-US" smtClean="0"/>
-              <a:t>7/8/2025</a:t>
+              <a:t>9/6/2025</a:t>
             </a:fld>
             <a:endParaRPr lang="en-US"/>
           </a:p>
@@ -9414,7 +9409,7 @@
           <a:p>
             <a:fld id="{2BC7EB92-A5C2-4807-A9DC-9EDE6CBFB241}" type="datetime1">
               <a:rPr lang="en-US" smtClean="0"/>
-              <a:t>7/8/2025</a:t>
+              <a:t>9/6/2025</a:t>
             </a:fld>
             <a:endParaRPr lang="en-US"/>
           </a:p>
@@ -9527,7 +9522,7 @@
           <a:p>
             <a:fld id="{2B7B7EE0-7771-4CD5-9B2B-3550753A54A1}" type="datetime1">
               <a:rPr lang="en-US" smtClean="0"/>
-              <a:t>7/8/2025</a:t>
+              <a:t>9/6/2025</a:t>
             </a:fld>
             <a:endParaRPr lang="en-US"/>
           </a:p>
@@ -9838,7 +9833,7 @@
           <a:p>
             <a:fld id="{F8B318B3-0E87-4416-A9B8-D891968C2727}" type="datetime1">
               <a:rPr lang="en-US" smtClean="0"/>
-              <a:t>7/8/2025</a:t>
+              <a:t>9/6/2025</a:t>
             </a:fld>
             <a:endParaRPr lang="en-US"/>
           </a:p>
@@ -10079,7 +10074,7 @@
           <a:p>
             <a:fld id="{54D997E8-DDEE-43F1-8D9B-F8A1E11DE488}" type="datetime1">
               <a:rPr lang="en-US" smtClean="0"/>
-              <a:t>7/8/2025</a:t>
+              <a:t>9/6/2025</a:t>
             </a:fld>
             <a:endParaRPr lang="en-US"/>
           </a:p>
@@ -10660,12 +10655,20 @@
           <a:lstStyle/>
           <a:p>
             <a:r>
+              <a:rPr lang="en-US">
+                <a:solidFill>
+                  <a:srgbClr val="5C5962"/>
+                </a:solidFill>
+              </a:rPr>
+              <a:t>© 2025 </a:t>
+            </a:r>
+            <a:r>
               <a:rPr lang="en-US" dirty="0">
                 <a:solidFill>
                   <a:srgbClr val="5C5962"/>
                 </a:solidFill>
               </a:rPr>
-              <a:t>© 2024-2025 Released under the </a:t>
+              <a:t>Released under the </a:t>
             </a:r>
             <a:r>
               <a:rPr lang="en-US" dirty="0">
@@ -38630,4 +38633,10 @@
     </a:ext>
   </a:extLst>
 </a:theme>
+</file>
+
+<file path=docMetadata/LabelInfo.xml><?xml version="1.0" encoding="utf-8"?>
+<clbl:labelList xmlns:clbl="http://schemas.microsoft.com/office/2020/mipLabelMetadata">
+  <clbl:label id="{7893ce20-a697-4fd6-a4da-14011f6a471d}" enabled="1" method="Standard" siteId="{a8eec281-aaa3-4dae-ac9b-9a398b9215e7}" contentBits="0" removed="0"/>
+</clbl:labelList>
 </file>
</xml_diff>

<commit_message>
fixed typo on slide 11
</commit_message>
<xml_diff>
--- a/Slides/Module 05 Interaction-Level Design Patterns.pptx
+++ b/Slides/Module 05 Interaction-Level Design Patterns.pptx
@@ -3224,7 +3224,7 @@
           <a:p>
             <a:fld id="{7C7E5181-6CF5-45F7-A87A-E0E0B1FD7549}" type="datetimeFigureOut">
               <a:rPr lang="en-US" smtClean="0"/>
-              <a:t>9/6/2025</a:t>
+              <a:t>9/16/2025</a:t>
             </a:fld>
             <a:endParaRPr lang="en-US"/>
           </a:p>
@@ -6655,7 +6655,7 @@
           <a:p>
             <a:fld id="{5D2A64DE-480B-420F-9649-4F8E696E08E0}" type="datetime1">
               <a:rPr lang="en-US" smtClean="0"/>
-              <a:t>9/6/2025</a:t>
+              <a:t>9/16/2025</a:t>
             </a:fld>
             <a:endParaRPr lang="en-US"/>
           </a:p>
@@ -6979,7 +6979,7 @@
           <a:p>
             <a:fld id="{EA476A42-A091-4468-A075-64A31BE59948}" type="datetime1">
               <a:rPr lang="en-US" smtClean="0"/>
-              <a:t>9/6/2025</a:t>
+              <a:t>9/16/2025</a:t>
             </a:fld>
             <a:endParaRPr lang="en-US"/>
           </a:p>
@@ -7177,7 +7177,7 @@
           <a:p>
             <a:fld id="{0D3616D0-8311-4107-9726-6B805E7D05BA}" type="datetime1">
               <a:rPr lang="en-US" smtClean="0"/>
-              <a:t>9/6/2025</a:t>
+              <a:t>9/16/2025</a:t>
             </a:fld>
             <a:endParaRPr lang="en-US"/>
           </a:p>
@@ -7385,7 +7385,7 @@
           <a:p>
             <a:fld id="{3BC2557A-5C88-417A-A763-5AC779462A5F}" type="datetime1">
               <a:rPr lang="en-US" smtClean="0"/>
-              <a:t>9/6/2025</a:t>
+              <a:t>9/16/2025</a:t>
             </a:fld>
             <a:endParaRPr lang="en-US"/>
           </a:p>
@@ -7909,7 +7909,7 @@
           <a:p>
             <a:fld id="{07C7BFD4-467E-4EDE-93EA-052F5B39A4E5}" type="datetime1">
               <a:rPr lang="en-US" smtClean="0"/>
-              <a:t>9/6/2025</a:t>
+              <a:t>9/16/2025</a:t>
             </a:fld>
             <a:endParaRPr lang="en-US"/>
           </a:p>
@@ -8159,7 +8159,7 @@
           <a:p>
             <a:fld id="{07C7BFD4-467E-4EDE-93EA-052F5B39A4E5}" type="datetime1">
               <a:rPr lang="en-US" smtClean="0"/>
-              <a:t>9/6/2025</a:t>
+              <a:t>9/16/2025</a:t>
             </a:fld>
             <a:endParaRPr lang="en-US"/>
           </a:p>
@@ -8347,7 +8347,7 @@
           <a:p>
             <a:fld id="{109E55A0-C911-4F03-82FC-7E5926047D46}" type="datetime1">
               <a:rPr lang="en-US" smtClean="0"/>
-              <a:t>9/6/2025</a:t>
+              <a:t>9/16/2025</a:t>
             </a:fld>
             <a:endParaRPr lang="en-US"/>
           </a:p>
@@ -8660,7 +8660,7 @@
           <a:p>
             <a:fld id="{A533CBE2-D5BE-47AC-ADC2-9CDFC1D0CF90}" type="datetime1">
               <a:rPr lang="en-US" smtClean="0"/>
-              <a:t>9/6/2025</a:t>
+              <a:t>9/16/2025</a:t>
             </a:fld>
             <a:endParaRPr lang="en-US"/>
           </a:p>
@@ -8961,7 +8961,7 @@
           <a:p>
             <a:fld id="{39B7EDB1-CE74-4951-85A2-0B01C2128E28}" type="datetime1">
               <a:rPr lang="en-US" smtClean="0"/>
-              <a:t>9/6/2025</a:t>
+              <a:t>9/16/2025</a:t>
             </a:fld>
             <a:endParaRPr lang="en-US"/>
           </a:p>
@@ -9409,7 +9409,7 @@
           <a:p>
             <a:fld id="{2BC7EB92-A5C2-4807-A9DC-9EDE6CBFB241}" type="datetime1">
               <a:rPr lang="en-US" smtClean="0"/>
-              <a:t>9/6/2025</a:t>
+              <a:t>9/16/2025</a:t>
             </a:fld>
             <a:endParaRPr lang="en-US"/>
           </a:p>
@@ -9522,7 +9522,7 @@
           <a:p>
             <a:fld id="{2B7B7EE0-7771-4CD5-9B2B-3550753A54A1}" type="datetime1">
               <a:rPr lang="en-US" smtClean="0"/>
-              <a:t>9/6/2025</a:t>
+              <a:t>9/16/2025</a:t>
             </a:fld>
             <a:endParaRPr lang="en-US"/>
           </a:p>
@@ -9833,7 +9833,7 @@
           <a:p>
             <a:fld id="{F8B318B3-0E87-4416-A9B8-D891968C2727}" type="datetime1">
               <a:rPr lang="en-US" smtClean="0"/>
-              <a:t>9/6/2025</a:t>
+              <a:t>9/16/2025</a:t>
             </a:fld>
             <a:endParaRPr lang="en-US"/>
           </a:p>
@@ -10074,7 +10074,7 @@
           <a:p>
             <a:fld id="{54D997E8-DDEE-43F1-8D9B-F8A1E11DE488}" type="datetime1">
               <a:rPr lang="en-US" smtClean="0"/>
-              <a:t>9/6/2025</a:t>
+              <a:t>9/16/2025</a:t>
             </a:fld>
             <a:endParaRPr lang="en-US"/>
           </a:p>
@@ -11855,15 +11855,15 @@
           <a:p>
             <a:r>
               <a:rPr lang="en-US" dirty="0"/>
-              <a:t>because the when the client needs </a:t>
-            </a:r>
-            <a:r>
-              <a:rPr lang="en-US" dirty="0" err="1"/>
-              <a:t>som</a:t>
+              <a:t>because the when the client </a:t>
+            </a:r>
+            <a:r>
+              <a:rPr lang="en-US"/>
+              <a:t>needs some </a:t>
             </a:r>
             <a:r>
               <a:rPr lang="en-US" dirty="0"/>
-              <a:t> data, it </a:t>
+              <a:t>data, it </a:t>
             </a:r>
             <a:r>
               <a:rPr lang="en-US" i="1" dirty="0"/>

</xml_diff>